<commit_message>
Updates to Ch 13 (including additional moment equation versions)
</commit_message>
<xml_diff>
--- a/Lecture Slides/VideoLectureSlides/A_2.7.pptx
+++ b/Lecture Slides/VideoLectureSlides/A_2.7.pptx
@@ -5,7 +5,7 @@
     <p:sldMasterId id="2147483660" r:id="rId4"/>
   </p:sldMasterIdLst>
   <p:notesMasterIdLst>
-    <p:notesMasterId r:id="rId25"/>
+    <p:notesMasterId r:id="rId27"/>
   </p:notesMasterIdLst>
   <p:sldIdLst>
     <p:sldId id="256" r:id="rId5"/>
@@ -28,6 +28,8 @@
     <p:sldId id="340" r:id="rId22"/>
     <p:sldId id="341" r:id="rId23"/>
     <p:sldId id="342" r:id="rId24"/>
+    <p:sldId id="343" r:id="rId25"/>
+    <p:sldId id="344" r:id="rId26"/>
   </p:sldIdLst>
   <p:sldSz cx="9144000" cy="6858000" type="screen4x3"/>
   <p:notesSz cx="6858000" cy="9144000"/>
@@ -16254,13 +16256,16 @@
               </a:ext>
             </a:extLst>
           </p:cNvPr>
-          <p:cNvCxnSpPr/>
+          <p:cNvCxnSpPr>
+            <a:cxnSpLocks/>
+            <a:stCxn id="30" idx="0"/>
+          </p:cNvCxnSpPr>
           <p:nvPr/>
         </p:nvCxnSpPr>
         <p:spPr>
           <a:xfrm flipV="1">
-            <a:off x="7292743" y="1383343"/>
-            <a:ext cx="0" cy="1905000"/>
+            <a:off x="7292742" y="1383343"/>
+            <a:ext cx="1" cy="2578200"/>
           </a:xfrm>
           <a:prstGeom prst="straightConnector1">
             <a:avLst/>
@@ -16610,8 +16615,8 @@
             </p:nvSpPr>
             <p:spPr>
               <a:xfrm>
-                <a:off x="6849277" y="1106344"/>
-                <a:ext cx="488082" cy="553998"/>
+                <a:off x="6385764" y="1314145"/>
+                <a:ext cx="949491" cy="553998"/>
               </a:xfrm>
               <a:prstGeom prst="rect">
                 <a:avLst/>
@@ -16635,6 +16640,24 @@
                           <a:latin typeface="Cambria Math" panose="02040503050406030204" pitchFamily="18" charset="0"/>
                         </a:rPr>
                         <m:t>𝑦</m:t>
+                      </m:r>
+                      <m:r>
+                        <a:rPr lang="en-CA" sz="3000" b="0" i="1" dirty="0" smtClean="0">
+                          <a:latin typeface="Cambria Math" panose="02040503050406030204" pitchFamily="18" charset="0"/>
+                        </a:rPr>
+                        <m:t>, </m:t>
+                      </m:r>
+                      <m:r>
+                        <a:rPr lang="en-CA" sz="3000" b="0" i="1" dirty="0" smtClean="0">
+                          <a:latin typeface="Cambria Math" panose="02040503050406030204" pitchFamily="18" charset="0"/>
+                        </a:rPr>
+                        <m:t>𝑦</m:t>
+                      </m:r>
+                      <m:r>
+                        <a:rPr lang="en-CA" sz="3000" b="0" i="1" dirty="0" smtClean="0">
+                          <a:latin typeface="Cambria Math" panose="02040503050406030204" pitchFamily="18" charset="0"/>
+                        </a:rPr>
+                        <m:t>′</m:t>
                       </m:r>
                     </m:oMath>
                   </m:oMathPara>
@@ -16661,8 +16684,8 @@
             </p:nvSpPr>
             <p:spPr>
               <a:xfrm>
-                <a:off x="6849277" y="1106344"/>
-                <a:ext cx="488082" cy="553998"/>
+                <a:off x="6385764" y="1314145"/>
+                <a:ext cx="949491" cy="553998"/>
               </a:xfrm>
               <a:prstGeom prst="rect">
                 <a:avLst/>
@@ -16670,7 +16693,7 @@
               <a:blipFill>
                 <a:blip r:embed="rId4"/>
                 <a:stretch>
-                  <a:fillRect b="-8889"/>
+                  <a:fillRect r="-5333" b="-20455"/>
                 </a:stretch>
               </a:blipFill>
             </p:spPr>
@@ -17478,6 +17501,483 @@
     <p:extLst>
       <p:ext uri="{BB962C8B-B14F-4D97-AF65-F5344CB8AC3E}">
         <p14:creationId xmlns:p14="http://schemas.microsoft.com/office/powerpoint/2010/main" val="1382861958"/>
+      </p:ext>
+    </p:extLst>
+  </p:cSld>
+  <p:clrMapOvr>
+    <a:masterClrMapping/>
+  </p:clrMapOvr>
+</p:sld>
+</file>
+
+<file path=ppt/slides/slide21.xml><?xml version="1.0" encoding="utf-8"?>
+<p:sld xmlns:a="http://schemas.openxmlformats.org/drawingml/2006/main" xmlns:r="http://schemas.openxmlformats.org/officeDocument/2006/relationships" xmlns:p="http://schemas.openxmlformats.org/presentationml/2006/main">
+  <p:cSld>
+    <p:spTree>
+      <p:nvGrpSpPr>
+        <p:cNvPr id="1" name=""/>
+        <p:cNvGrpSpPr/>
+        <p:nvPr/>
+      </p:nvGrpSpPr>
+      <p:grpSpPr>
+        <a:xfrm>
+          <a:off x="0" y="0"/>
+          <a:ext cx="0" cy="0"/>
+          <a:chOff x="0" y="0"/>
+          <a:chExt cx="0" cy="0"/>
+        </a:xfrm>
+      </p:grpSpPr>
+      <p:sp>
+        <p:nvSpPr>
+          <p:cNvPr id="2" name="Title 1">
+            <a:extLst>
+              <a:ext uri="{FF2B5EF4-FFF2-40B4-BE49-F238E27FC236}">
+                <a16:creationId xmlns:a16="http://schemas.microsoft.com/office/drawing/2014/main" id="{EBF9E68E-5D5C-D94A-B9DA-D0CF873407AF}"/>
+              </a:ext>
+            </a:extLst>
+          </p:cNvPr>
+          <p:cNvSpPr>
+            <a:spLocks noGrp="1"/>
+          </p:cNvSpPr>
+          <p:nvPr>
+            <p:ph type="title"/>
+          </p:nvPr>
+        </p:nvSpPr>
+        <p:spPr/>
+        <p:txBody>
+          <a:bodyPr/>
+          <a:lstStyle/>
+          <a:p>
+            <a:endParaRPr lang="en-US"/>
+          </a:p>
+        </p:txBody>
+      </p:sp>
+      <p:sp>
+        <p:nvSpPr>
+          <p:cNvPr id="3" name="Content Placeholder 2">
+            <a:extLst>
+              <a:ext uri="{FF2B5EF4-FFF2-40B4-BE49-F238E27FC236}">
+                <a16:creationId xmlns:a16="http://schemas.microsoft.com/office/drawing/2014/main" id="{9B6CE1B3-2373-D642-8261-6FF90033A530}"/>
+              </a:ext>
+            </a:extLst>
+          </p:cNvPr>
+          <p:cNvSpPr>
+            <a:spLocks noGrp="1"/>
+          </p:cNvSpPr>
+          <p:nvPr>
+            <p:ph idx="1"/>
+          </p:nvPr>
+        </p:nvSpPr>
+        <p:spPr/>
+        <p:txBody>
+          <a:bodyPr/>
+          <a:lstStyle/>
+          <a:p>
+            <a:endParaRPr lang="en-US"/>
+          </a:p>
+        </p:txBody>
+      </p:sp>
+      <p:sp>
+        <p:nvSpPr>
+          <p:cNvPr id="4" name="Slide Number Placeholder 3">
+            <a:extLst>
+              <a:ext uri="{FF2B5EF4-FFF2-40B4-BE49-F238E27FC236}">
+                <a16:creationId xmlns:a16="http://schemas.microsoft.com/office/drawing/2014/main" id="{009F84FA-BA13-574E-B05B-7C5539CB244B}"/>
+              </a:ext>
+            </a:extLst>
+          </p:cNvPr>
+          <p:cNvSpPr>
+            <a:spLocks noGrp="1"/>
+          </p:cNvSpPr>
+          <p:nvPr>
+            <p:ph type="sldNum" sz="quarter" idx="12"/>
+          </p:nvPr>
+        </p:nvSpPr>
+        <p:spPr/>
+        <p:txBody>
+          <a:bodyPr/>
+          <a:lstStyle/>
+          <a:p>
+            <a:fld id="{929262FE-7F58-4A1E-8AF3-5A510A86DEBD}" type="slidenum">
+              <a:rPr lang="en-US" smtClean="0"/>
+              <a:t>21</a:t>
+            </a:fld>
+            <a:endParaRPr lang="en-US"/>
+          </a:p>
+        </p:txBody>
+      </p:sp>
+    </p:spTree>
+    <p:extLst>
+      <p:ext uri="{BB962C8B-B14F-4D97-AF65-F5344CB8AC3E}">
+        <p14:creationId xmlns:p14="http://schemas.microsoft.com/office/powerpoint/2010/main" val="881997567"/>
+      </p:ext>
+    </p:extLst>
+  </p:cSld>
+  <p:clrMapOvr>
+    <a:masterClrMapping/>
+  </p:clrMapOvr>
+</p:sld>
+</file>
+
+<file path=ppt/slides/slide22.xml><?xml version="1.0" encoding="utf-8"?>
+<p:sld xmlns:a="http://schemas.openxmlformats.org/drawingml/2006/main" xmlns:r="http://schemas.openxmlformats.org/officeDocument/2006/relationships" xmlns:p="http://schemas.openxmlformats.org/presentationml/2006/main">
+  <p:cSld>
+    <p:spTree>
+      <p:nvGrpSpPr>
+        <p:cNvPr id="1" name=""/>
+        <p:cNvGrpSpPr/>
+        <p:nvPr/>
+      </p:nvGrpSpPr>
+      <p:grpSpPr>
+        <a:xfrm>
+          <a:off x="0" y="0"/>
+          <a:ext cx="0" cy="0"/>
+          <a:chOff x="0" y="0"/>
+          <a:chExt cx="0" cy="0"/>
+        </a:xfrm>
+      </p:grpSpPr>
+      <p:grpSp>
+        <p:nvGrpSpPr>
+          <p:cNvPr id="9" name="Group 8">
+            <a:extLst>
+              <a:ext uri="{FF2B5EF4-FFF2-40B4-BE49-F238E27FC236}">
+                <a16:creationId xmlns:a16="http://schemas.microsoft.com/office/drawing/2014/main" id="{C6953E1A-454C-E84C-871D-C6A6BFAC7246}"/>
+              </a:ext>
+            </a:extLst>
+          </p:cNvPr>
+          <p:cNvGrpSpPr/>
+          <p:nvPr/>
+        </p:nvGrpSpPr>
+        <p:grpSpPr>
+          <a:xfrm>
+            <a:off x="1024927" y="4310743"/>
+            <a:ext cx="3547073" cy="1838848"/>
+            <a:chOff x="1024927" y="3737986"/>
+            <a:chExt cx="4180118" cy="2411605"/>
+          </a:xfrm>
+        </p:grpSpPr>
+        <p:sp>
+          <p:nvSpPr>
+            <p:cNvPr id="5" name="Rectangle 4">
+              <a:extLst>
+                <a:ext uri="{FF2B5EF4-FFF2-40B4-BE49-F238E27FC236}">
+                  <a16:creationId xmlns:a16="http://schemas.microsoft.com/office/drawing/2014/main" id="{B1FE568C-30F1-8945-8A7F-E6933620A703}"/>
+                </a:ext>
+              </a:extLst>
+            </p:cNvPr>
+            <p:cNvSpPr/>
+            <p:nvPr/>
+          </p:nvSpPr>
+          <p:spPr>
+            <a:xfrm>
+              <a:off x="1024930" y="3737987"/>
+              <a:ext cx="4180115" cy="2411604"/>
+            </a:xfrm>
+            <a:prstGeom prst="rect">
+              <a:avLst/>
+            </a:prstGeom>
+            <a:solidFill>
+              <a:schemeClr val="bg1">
+                <a:lumMod val="75000"/>
+              </a:schemeClr>
+            </a:solidFill>
+            <a:ln>
+              <a:solidFill>
+                <a:schemeClr val="tx1"/>
+              </a:solidFill>
+            </a:ln>
+          </p:spPr>
+          <p:style>
+            <a:lnRef idx="2">
+              <a:schemeClr val="accent1">
+                <a:shade val="50000"/>
+              </a:schemeClr>
+            </a:lnRef>
+            <a:fillRef idx="1">
+              <a:schemeClr val="accent1"/>
+            </a:fillRef>
+            <a:effectRef idx="0">
+              <a:schemeClr val="accent1"/>
+            </a:effectRef>
+            <a:fontRef idx="minor">
+              <a:schemeClr val="lt1"/>
+            </a:fontRef>
+          </p:style>
+          <p:txBody>
+            <a:bodyPr rtlCol="0" anchor="ctr"/>
+            <a:lstStyle/>
+            <a:p>
+              <a:pPr algn="ctr"/>
+              <a:endParaRPr lang="en-US"/>
+            </a:p>
+          </p:txBody>
+        </p:sp>
+        <p:sp>
+          <p:nvSpPr>
+            <p:cNvPr id="6" name="Triangle 5">
+              <a:extLst>
+                <a:ext uri="{FF2B5EF4-FFF2-40B4-BE49-F238E27FC236}">
+                  <a16:creationId xmlns:a16="http://schemas.microsoft.com/office/drawing/2014/main" id="{4015A3C2-650B-7148-AD08-78E2CD7774C5}"/>
+                </a:ext>
+              </a:extLst>
+            </p:cNvPr>
+            <p:cNvSpPr/>
+            <p:nvPr/>
+          </p:nvSpPr>
+          <p:spPr>
+            <a:xfrm rot="10800000">
+              <a:off x="1024929" y="3737986"/>
+              <a:ext cx="4180115" cy="1507253"/>
+            </a:xfrm>
+            <a:prstGeom prst="triangle">
+              <a:avLst/>
+            </a:prstGeom>
+            <a:solidFill>
+              <a:schemeClr val="bg1">
+                <a:lumMod val="75000"/>
+              </a:schemeClr>
+            </a:solidFill>
+            <a:ln>
+              <a:solidFill>
+                <a:schemeClr val="tx1"/>
+              </a:solidFill>
+              <a:prstDash val="dash"/>
+            </a:ln>
+          </p:spPr>
+          <p:style>
+            <a:lnRef idx="2">
+              <a:schemeClr val="accent1">
+                <a:shade val="50000"/>
+              </a:schemeClr>
+            </a:lnRef>
+            <a:fillRef idx="1">
+              <a:schemeClr val="accent1"/>
+            </a:fillRef>
+            <a:effectRef idx="0">
+              <a:schemeClr val="accent1"/>
+            </a:effectRef>
+            <a:fontRef idx="minor">
+              <a:schemeClr val="lt1"/>
+            </a:fontRef>
+          </p:style>
+          <p:txBody>
+            <a:bodyPr rtlCol="0" anchor="ctr"/>
+            <a:lstStyle/>
+            <a:p>
+              <a:pPr algn="ctr"/>
+              <a:endParaRPr lang="en-US"/>
+            </a:p>
+          </p:txBody>
+        </p:sp>
+        <p:sp>
+          <p:nvSpPr>
+            <p:cNvPr id="7" name="Rectangle 6">
+              <a:extLst>
+                <a:ext uri="{FF2B5EF4-FFF2-40B4-BE49-F238E27FC236}">
+                  <a16:creationId xmlns:a16="http://schemas.microsoft.com/office/drawing/2014/main" id="{E5094BD0-7B25-964D-8FA8-1F56CD76DF5B}"/>
+                </a:ext>
+              </a:extLst>
+            </p:cNvPr>
+            <p:cNvSpPr/>
+            <p:nvPr/>
+          </p:nvSpPr>
+          <p:spPr>
+            <a:xfrm>
+              <a:off x="1024927" y="3737987"/>
+              <a:ext cx="4180115" cy="2411604"/>
+            </a:xfrm>
+            <a:prstGeom prst="rect">
+              <a:avLst/>
+            </a:prstGeom>
+            <a:noFill/>
+            <a:ln>
+              <a:solidFill>
+                <a:schemeClr val="tx1"/>
+              </a:solidFill>
+            </a:ln>
+          </p:spPr>
+          <p:style>
+            <a:lnRef idx="2">
+              <a:schemeClr val="accent1">
+                <a:shade val="50000"/>
+              </a:schemeClr>
+            </a:lnRef>
+            <a:fillRef idx="1">
+              <a:schemeClr val="accent1"/>
+            </a:fillRef>
+            <a:effectRef idx="0">
+              <a:schemeClr val="accent1"/>
+            </a:effectRef>
+            <a:fontRef idx="minor">
+              <a:schemeClr val="lt1"/>
+            </a:fontRef>
+          </p:style>
+          <p:txBody>
+            <a:bodyPr rtlCol="0" anchor="ctr"/>
+            <a:lstStyle/>
+            <a:p>
+              <a:pPr algn="ctr"/>
+              <a:endParaRPr lang="en-US"/>
+            </a:p>
+          </p:txBody>
+        </p:sp>
+      </p:grpSp>
+      <p:sp>
+        <p:nvSpPr>
+          <p:cNvPr id="8" name="Oval 7">
+            <a:extLst>
+              <a:ext uri="{FF2B5EF4-FFF2-40B4-BE49-F238E27FC236}">
+                <a16:creationId xmlns:a16="http://schemas.microsoft.com/office/drawing/2014/main" id="{141F86E3-4A73-ED4F-AFBC-2F345057C96A}"/>
+              </a:ext>
+            </a:extLst>
+          </p:cNvPr>
+          <p:cNvSpPr/>
+          <p:nvPr/>
+        </p:nvSpPr>
+        <p:spPr>
+          <a:xfrm>
+            <a:off x="1024926" y="485808"/>
+            <a:ext cx="3547071" cy="3546000"/>
+          </a:xfrm>
+          <a:prstGeom prst="ellipse">
+            <a:avLst/>
+          </a:prstGeom>
+          <a:solidFill>
+            <a:schemeClr val="bg1">
+              <a:lumMod val="75000"/>
+            </a:schemeClr>
+          </a:solidFill>
+          <a:ln>
+            <a:solidFill>
+              <a:schemeClr val="tx1"/>
+            </a:solidFill>
+          </a:ln>
+        </p:spPr>
+        <p:style>
+          <a:lnRef idx="2">
+            <a:schemeClr val="accent1">
+              <a:shade val="50000"/>
+            </a:schemeClr>
+          </a:lnRef>
+          <a:fillRef idx="1">
+            <a:schemeClr val="accent1"/>
+          </a:fillRef>
+          <a:effectRef idx="0">
+            <a:schemeClr val="accent1"/>
+          </a:effectRef>
+          <a:fontRef idx="minor">
+            <a:schemeClr val="lt1"/>
+          </a:fontRef>
+        </p:style>
+        <p:txBody>
+          <a:bodyPr rtlCol="0" anchor="ctr"/>
+          <a:lstStyle/>
+          <a:p>
+            <a:pPr algn="ctr"/>
+            <a:endParaRPr lang="en-US"/>
+          </a:p>
+        </p:txBody>
+      </p:sp>
+      <p:sp>
+        <p:nvSpPr>
+          <p:cNvPr id="10" name="Oval 9">
+            <a:extLst>
+              <a:ext uri="{FF2B5EF4-FFF2-40B4-BE49-F238E27FC236}">
+                <a16:creationId xmlns:a16="http://schemas.microsoft.com/office/drawing/2014/main" id="{82CFE4D7-D4EA-CB46-B9E3-0CAD250206CF}"/>
+              </a:ext>
+            </a:extLst>
+          </p:cNvPr>
+          <p:cNvSpPr>
+            <a:spLocks noChangeAspect="1"/>
+          </p:cNvSpPr>
+          <p:nvPr/>
+        </p:nvSpPr>
+        <p:spPr>
+          <a:xfrm>
+            <a:off x="2731748" y="5388024"/>
+            <a:ext cx="144000" cy="144000"/>
+          </a:xfrm>
+          <a:prstGeom prst="ellipse">
+            <a:avLst/>
+          </a:prstGeom>
+        </p:spPr>
+        <p:style>
+          <a:lnRef idx="2">
+            <a:schemeClr val="dk1">
+              <a:shade val="50000"/>
+            </a:schemeClr>
+          </a:lnRef>
+          <a:fillRef idx="1">
+            <a:schemeClr val="dk1"/>
+          </a:fillRef>
+          <a:effectRef idx="0">
+            <a:schemeClr val="dk1"/>
+          </a:effectRef>
+          <a:fontRef idx="minor">
+            <a:schemeClr val="lt1"/>
+          </a:fontRef>
+        </p:style>
+        <p:txBody>
+          <a:bodyPr rtlCol="0" anchor="ctr"/>
+          <a:lstStyle/>
+          <a:p>
+            <a:pPr algn="ctr"/>
+            <a:endParaRPr lang="en-US"/>
+          </a:p>
+        </p:txBody>
+      </p:sp>
+      <p:sp>
+        <p:nvSpPr>
+          <p:cNvPr id="11" name="Oval 10">
+            <a:extLst>
+              <a:ext uri="{FF2B5EF4-FFF2-40B4-BE49-F238E27FC236}">
+                <a16:creationId xmlns:a16="http://schemas.microsoft.com/office/drawing/2014/main" id="{B75A2BF7-19DA-3148-83CD-2F9D6F8C73B2}"/>
+              </a:ext>
+            </a:extLst>
+          </p:cNvPr>
+          <p:cNvSpPr>
+            <a:spLocks noChangeAspect="1"/>
+          </p:cNvSpPr>
+          <p:nvPr/>
+        </p:nvSpPr>
+        <p:spPr>
+          <a:xfrm>
+            <a:off x="2731748" y="2186808"/>
+            <a:ext cx="144000" cy="144000"/>
+          </a:xfrm>
+          <a:prstGeom prst="ellipse">
+            <a:avLst/>
+          </a:prstGeom>
+        </p:spPr>
+        <p:style>
+          <a:lnRef idx="2">
+            <a:schemeClr val="dk1">
+              <a:shade val="50000"/>
+            </a:schemeClr>
+          </a:lnRef>
+          <a:fillRef idx="1">
+            <a:schemeClr val="dk1"/>
+          </a:fillRef>
+          <a:effectRef idx="0">
+            <a:schemeClr val="dk1"/>
+          </a:effectRef>
+          <a:fontRef idx="minor">
+            <a:schemeClr val="lt1"/>
+          </a:fontRef>
+        </p:style>
+        <p:txBody>
+          <a:bodyPr rtlCol="0" anchor="ctr"/>
+          <a:lstStyle/>
+          <a:p>
+            <a:pPr algn="ctr"/>
+            <a:endParaRPr lang="en-US"/>
+          </a:p>
+        </p:txBody>
+      </p:sp>
+    </p:spTree>
+    <p:extLst>
+      <p:ext uri="{BB962C8B-B14F-4D97-AF65-F5344CB8AC3E}">
+        <p14:creationId xmlns:p14="http://schemas.microsoft.com/office/powerpoint/2010/main" val="3486983649"/>
       </p:ext>
     </p:extLst>
   </p:cSld>

</xml_diff>

<commit_message>
Updates to 2D centroids table
</commit_message>
<xml_diff>
--- a/Lecture Slides/VideoLectureSlides/A_2.7.pptx
+++ b/Lecture Slides/VideoLectureSlides/A_2.7.pptx
@@ -1984,7 +1984,7 @@
           <a:p>
             <a:fld id="{1AA1AB63-216F-4D5B-8811-CCB935E98D4A}" type="datetimeFigureOut">
               <a:rPr lang="en-US" smtClean="0"/>
-              <a:t>9/24/21</a:t>
+              <a:t>10/5/21</a:t>
             </a:fld>
             <a:endParaRPr lang="en-US"/>
           </a:p>
@@ -14689,7 +14689,7 @@
         </p:nvSpPr>
         <p:spPr>
           <a:xfrm rot="5400000">
-            <a:off x="1154154" y="1905000"/>
+            <a:off x="3694737" y="1969463"/>
             <a:ext cx="4273888" cy="4273888"/>
           </a:xfrm>
           <a:prstGeom prst="chord">
@@ -14741,7 +14741,7 @@
         </p:nvSpPr>
         <p:spPr>
           <a:xfrm>
-            <a:off x="7176349" y="1908342"/>
+            <a:off x="1645832" y="1979511"/>
             <a:ext cx="228600" cy="2133601"/>
           </a:xfrm>
           <a:prstGeom prst="rect">
@@ -14790,7 +14790,7 @@
         </p:nvCxnSpPr>
         <p:spPr>
           <a:xfrm flipV="1">
-            <a:off x="3291099" y="1371600"/>
+            <a:off x="5831682" y="1436063"/>
             <a:ext cx="0" cy="1905000"/>
           </a:xfrm>
           <a:prstGeom prst="straightConnector1">
@@ -14832,7 +14832,7 @@
         </p:nvSpPr>
         <p:spPr>
           <a:xfrm>
-            <a:off x="3219098" y="3276600"/>
+            <a:off x="5759681" y="3341063"/>
             <a:ext cx="144000" cy="144000"/>
           </a:xfrm>
           <a:prstGeom prst="ellipse">
@@ -14880,7 +14880,7 @@
         </p:nvSpPr>
         <p:spPr>
           <a:xfrm>
-            <a:off x="7220742" y="3288343"/>
+            <a:off x="1690225" y="3359512"/>
             <a:ext cx="144000" cy="144000"/>
           </a:xfrm>
           <a:prstGeom prst="ellipse">
@@ -14926,7 +14926,7 @@
         </p:nvCxnSpPr>
         <p:spPr>
           <a:xfrm flipV="1">
-            <a:off x="7292743" y="1383343"/>
+            <a:off x="1762226" y="1454512"/>
             <a:ext cx="0" cy="1905000"/>
           </a:xfrm>
           <a:prstGeom prst="straightConnector1">
@@ -14968,7 +14968,7 @@
         </p:nvCxnSpPr>
         <p:spPr>
           <a:xfrm flipV="1">
-            <a:off x="3363098" y="3331015"/>
+            <a:off x="5903681" y="3395478"/>
             <a:ext cx="2304158" cy="8400"/>
           </a:xfrm>
           <a:prstGeom prst="straightConnector1">
@@ -15009,8 +15009,8 @@
           <p:nvPr/>
         </p:nvCxnSpPr>
         <p:spPr>
-          <a:xfrm flipH="1">
-            <a:off x="6188125" y="3362874"/>
+          <a:xfrm>
+            <a:off x="1834225" y="3431512"/>
             <a:ext cx="1084522" cy="0"/>
           </a:xfrm>
           <a:prstGeom prst="straightConnector1">
@@ -15050,7 +15050,7 @@
         </p:nvSpPr>
         <p:spPr>
           <a:xfrm>
-            <a:off x="2766524" y="3071601"/>
+            <a:off x="5307107" y="3136064"/>
             <a:ext cx="426720" cy="553998"/>
           </a:xfrm>
           <a:prstGeom prst="rect">
@@ -15087,7 +15087,7 @@
             </p:nvSpPr>
             <p:spPr>
               <a:xfrm>
-                <a:off x="5340005" y="2731002"/>
+                <a:off x="7880588" y="2795465"/>
                 <a:ext cx="488082" cy="553998"/>
               </a:xfrm>
               <a:prstGeom prst="rect">
@@ -15101,6 +15101,7 @@
               </a:bodyPr>
               <a:lstStyle/>
               <a:p>
+                <a:pPr/>
                 <a14:m>
                   <m:oMathPara xmlns:m="http://schemas.openxmlformats.org/officeDocument/2006/math">
                     <m:oMathParaPr>
@@ -15138,7 +15139,7 @@
             </p:nvSpPr>
             <p:spPr>
               <a:xfrm>
-                <a:off x="5340005" y="2731002"/>
+                <a:off x="7880588" y="2795465"/>
                 <a:ext cx="488082" cy="553998"/>
               </a:xfrm>
               <a:prstGeom prst="rect">
@@ -15182,7 +15183,7 @@
             </p:nvSpPr>
             <p:spPr>
               <a:xfrm>
-                <a:off x="2875016" y="1013416"/>
+                <a:off x="5415599" y="1077879"/>
                 <a:ext cx="488082" cy="553998"/>
               </a:xfrm>
               <a:prstGeom prst="rect">
@@ -15196,6 +15197,7 @@
               </a:bodyPr>
               <a:lstStyle/>
               <a:p>
+                <a:pPr/>
                 <a14:m>
                   <m:oMathPara xmlns:m="http://schemas.openxmlformats.org/officeDocument/2006/math">
                     <m:oMathParaPr>
@@ -15233,7 +15235,7 @@
             </p:nvSpPr>
             <p:spPr>
               <a:xfrm>
-                <a:off x="2875016" y="1013416"/>
+                <a:off x="5415599" y="1077879"/>
                 <a:ext cx="488082" cy="553998"/>
               </a:xfrm>
               <a:prstGeom prst="rect">
@@ -15277,7 +15279,7 @@
             </p:nvSpPr>
             <p:spPr>
               <a:xfrm>
-                <a:off x="6849277" y="1106344"/>
+                <a:off x="1318760" y="1177513"/>
                 <a:ext cx="488082" cy="553998"/>
               </a:xfrm>
               <a:prstGeom prst="rect">
@@ -15291,6 +15293,7 @@
               </a:bodyPr>
               <a:lstStyle/>
               <a:p>
+                <a:pPr/>
                 <a14:m>
                   <m:oMathPara xmlns:m="http://schemas.openxmlformats.org/officeDocument/2006/math">
                     <m:oMathParaPr>
@@ -15328,7 +15331,7 @@
             </p:nvSpPr>
             <p:spPr>
               <a:xfrm>
-                <a:off x="6849277" y="1106344"/>
+                <a:off x="1318760" y="1177513"/>
                 <a:ext cx="488082" cy="553998"/>
               </a:xfrm>
               <a:prstGeom prst="rect">
@@ -15372,7 +15375,7 @@
             </p:nvSpPr>
             <p:spPr>
               <a:xfrm>
-                <a:off x="6117759" y="2760401"/>
+                <a:off x="1973802" y="2769312"/>
                 <a:ext cx="463781" cy="553998"/>
               </a:xfrm>
               <a:prstGeom prst="rect">
@@ -15386,6 +15389,7 @@
               </a:bodyPr>
               <a:lstStyle/>
               <a:p>
+                <a:pPr/>
                 <a14:m>
                   <m:oMathPara xmlns:m="http://schemas.openxmlformats.org/officeDocument/2006/math">
                     <m:oMathParaPr>
@@ -15423,7 +15427,7 @@
             </p:nvSpPr>
             <p:spPr>
               <a:xfrm>
-                <a:off x="6117759" y="2760401"/>
+                <a:off x="1973802" y="2769312"/>
                 <a:ext cx="463781" cy="553998"/>
               </a:xfrm>
               <a:prstGeom prst="rect">
@@ -15465,7 +15469,7 @@
         </p:nvSpPr>
         <p:spPr>
           <a:xfrm>
-            <a:off x="2597959" y="4286412"/>
+            <a:off x="5138542" y="4350875"/>
             <a:ext cx="1386277" cy="369332"/>
           </a:xfrm>
           <a:prstGeom prst="rect">
@@ -15500,7 +15504,7 @@
         </p:nvSpPr>
         <p:spPr>
           <a:xfrm>
-            <a:off x="6603569" y="4299012"/>
+            <a:off x="1392553" y="4381648"/>
             <a:ext cx="1162498" cy="369332"/>
           </a:xfrm>
           <a:prstGeom prst="rect">
@@ -15517,6 +15521,41 @@
             <a:r>
               <a:rPr lang="en-US" dirty="0"/>
               <a:t>SIDE VIEW</a:t>
+            </a:r>
+          </a:p>
+        </p:txBody>
+      </p:sp>
+      <p:sp>
+        <p:nvSpPr>
+          <p:cNvPr id="21" name="TextBox 20">
+            <a:extLst>
+              <a:ext uri="{FF2B5EF4-FFF2-40B4-BE49-F238E27FC236}">
+                <a16:creationId xmlns:a16="http://schemas.microsoft.com/office/drawing/2014/main" id="{AF73B4BC-4924-AC48-A39D-C53CCD714167}"/>
+              </a:ext>
+            </a:extLst>
+          </p:cNvPr>
+          <p:cNvSpPr txBox="1"/>
+          <p:nvPr/>
+        </p:nvSpPr>
+        <p:spPr>
+          <a:xfrm>
+            <a:off x="1169427" y="3145859"/>
+            <a:ext cx="426720" cy="553998"/>
+          </a:xfrm>
+          <a:prstGeom prst="rect">
+            <a:avLst/>
+          </a:prstGeom>
+          <a:noFill/>
+        </p:spPr>
+        <p:txBody>
+          <a:bodyPr wrap="none" rtlCol="0">
+            <a:spAutoFit/>
+          </a:bodyPr>
+          <a:lstStyle/>
+          <a:p>
+            <a:r>
+              <a:rPr lang="en-US" sz="3000" dirty="0"/>
+              <a:t>G</a:t>
             </a:r>
           </a:p>
         </p:txBody>
@@ -16024,7 +16063,7 @@
         </p:nvSpPr>
         <p:spPr>
           <a:xfrm rot="5400000">
-            <a:off x="1154154" y="1905000"/>
+            <a:off x="3686338" y="1921057"/>
             <a:ext cx="4273888" cy="4273888"/>
           </a:xfrm>
           <a:prstGeom prst="chord">
@@ -16076,7 +16115,7 @@
         </p:nvSpPr>
         <p:spPr>
           <a:xfrm>
-            <a:off x="7176349" y="1908342"/>
+            <a:off x="1495394" y="1924399"/>
             <a:ext cx="228600" cy="2133601"/>
           </a:xfrm>
           <a:prstGeom prst="rect">
@@ -16125,7 +16164,7 @@
         </p:nvCxnSpPr>
         <p:spPr>
           <a:xfrm flipV="1">
-            <a:off x="3291099" y="1371600"/>
+            <a:off x="5823283" y="1387657"/>
             <a:ext cx="0" cy="1905000"/>
           </a:xfrm>
           <a:prstGeom prst="straightConnector1">
@@ -16167,7 +16206,7 @@
         </p:nvSpPr>
         <p:spPr>
           <a:xfrm>
-            <a:off x="3219098" y="3276600"/>
+            <a:off x="5751282" y="3292657"/>
             <a:ext cx="144000" cy="144000"/>
           </a:xfrm>
           <a:prstGeom prst="ellipse">
@@ -16215,7 +16254,7 @@
         </p:nvSpPr>
         <p:spPr>
           <a:xfrm>
-            <a:off x="7220742" y="3288343"/>
+            <a:off x="1539787" y="3304400"/>
             <a:ext cx="144000" cy="144000"/>
           </a:xfrm>
           <a:prstGeom prst="ellipse">
@@ -16264,7 +16303,7 @@
         </p:nvCxnSpPr>
         <p:spPr>
           <a:xfrm flipV="1">
-            <a:off x="7292742" y="1383343"/>
+            <a:off x="1611787" y="1399400"/>
             <a:ext cx="1" cy="2578200"/>
           </a:xfrm>
           <a:prstGeom prst="straightConnector1">
@@ -16306,7 +16345,7 @@
         </p:nvCxnSpPr>
         <p:spPr>
           <a:xfrm flipV="1">
-            <a:off x="3363098" y="3331015"/>
+            <a:off x="5895282" y="3347072"/>
             <a:ext cx="2304158" cy="8400"/>
           </a:xfrm>
           <a:prstGeom prst="straightConnector1">
@@ -16347,8 +16386,8 @@
           <p:nvPr/>
         </p:nvCxnSpPr>
         <p:spPr>
-          <a:xfrm flipH="1">
-            <a:off x="6188125" y="3362874"/>
+          <a:xfrm>
+            <a:off x="1654300" y="3369854"/>
             <a:ext cx="1084522" cy="0"/>
           </a:xfrm>
           <a:prstGeom prst="straightConnector1">
@@ -16388,7 +16427,7 @@
         </p:nvSpPr>
         <p:spPr>
           <a:xfrm>
-            <a:off x="2766524" y="3071601"/>
+            <a:off x="5298708" y="3087658"/>
             <a:ext cx="426720" cy="553998"/>
           </a:xfrm>
           <a:prstGeom prst="rect">
@@ -16425,7 +16464,7 @@
             </p:nvSpPr>
             <p:spPr>
               <a:xfrm>
-                <a:off x="5340005" y="2731002"/>
+                <a:off x="7872189" y="2747059"/>
                 <a:ext cx="488082" cy="553998"/>
               </a:xfrm>
               <a:prstGeom prst="rect">
@@ -16439,6 +16478,7 @@
               </a:bodyPr>
               <a:lstStyle/>
               <a:p>
+                <a:pPr/>
                 <a14:m>
                   <m:oMathPara xmlns:m="http://schemas.openxmlformats.org/officeDocument/2006/math">
                     <m:oMathParaPr>
@@ -16476,7 +16516,7 @@
             </p:nvSpPr>
             <p:spPr>
               <a:xfrm>
-                <a:off x="5340005" y="2731002"/>
+                <a:off x="7872189" y="2747059"/>
                 <a:ext cx="488082" cy="553998"/>
               </a:xfrm>
               <a:prstGeom prst="rect">
@@ -16520,7 +16560,7 @@
             </p:nvSpPr>
             <p:spPr>
               <a:xfrm>
-                <a:off x="2875016" y="1013416"/>
+                <a:off x="5407200" y="1029473"/>
                 <a:ext cx="488082" cy="553998"/>
               </a:xfrm>
               <a:prstGeom prst="rect">
@@ -16534,6 +16574,7 @@
               </a:bodyPr>
               <a:lstStyle/>
               <a:p>
+                <a:pPr/>
                 <a14:m>
                   <m:oMathPara xmlns:m="http://schemas.openxmlformats.org/officeDocument/2006/math">
                     <m:oMathParaPr>
@@ -16571,7 +16612,7 @@
             </p:nvSpPr>
             <p:spPr>
               <a:xfrm>
-                <a:off x="2875016" y="1013416"/>
+                <a:off x="5407200" y="1029473"/>
                 <a:ext cx="488082" cy="553998"/>
               </a:xfrm>
               <a:prstGeom prst="rect">
@@ -16580,7 +16621,7 @@
               <a:blipFill>
                 <a:blip r:embed="rId3"/>
                 <a:stretch>
-                  <a:fillRect b="-8889"/>
+                  <a:fillRect b="-11364"/>
                 </a:stretch>
               </a:blipFill>
             </p:spPr>
@@ -16615,7 +16656,7 @@
             </p:nvSpPr>
             <p:spPr>
               <a:xfrm>
-                <a:off x="6385764" y="1314145"/>
+                <a:off x="704809" y="1330202"/>
                 <a:ext cx="949491" cy="553998"/>
               </a:xfrm>
               <a:prstGeom prst="rect">
@@ -16629,6 +16670,7 @@
               </a:bodyPr>
               <a:lstStyle/>
               <a:p>
+                <a:pPr/>
                 <a14:m>
                   <m:oMathPara xmlns:m="http://schemas.openxmlformats.org/officeDocument/2006/math">
                     <m:oMathParaPr>
@@ -16684,7 +16726,7 @@
             </p:nvSpPr>
             <p:spPr>
               <a:xfrm>
-                <a:off x="6385764" y="1314145"/>
+                <a:off x="704809" y="1330202"/>
                 <a:ext cx="949491" cy="553998"/>
               </a:xfrm>
               <a:prstGeom prst="rect">
@@ -16693,7 +16735,7 @@
               <a:blipFill>
                 <a:blip r:embed="rId4"/>
                 <a:stretch>
-                  <a:fillRect r="-5333" b="-20455"/>
+                  <a:fillRect r="-3947" b="-17778"/>
                 </a:stretch>
               </a:blipFill>
             </p:spPr>
@@ -16728,7 +16770,7 @@
             </p:nvSpPr>
             <p:spPr>
               <a:xfrm>
-                <a:off x="6117759" y="2760401"/>
+                <a:off x="2175586" y="2815856"/>
                 <a:ext cx="463781" cy="553998"/>
               </a:xfrm>
               <a:prstGeom prst="rect">
@@ -16742,6 +16784,7 @@
               </a:bodyPr>
               <a:lstStyle/>
               <a:p>
+                <a:pPr/>
                 <a14:m>
                   <m:oMathPara xmlns:m="http://schemas.openxmlformats.org/officeDocument/2006/math">
                     <m:oMathParaPr>
@@ -16779,7 +16822,7 @@
             </p:nvSpPr>
             <p:spPr>
               <a:xfrm>
-                <a:off x="6117759" y="2760401"/>
+                <a:off x="2175586" y="2815856"/>
                 <a:ext cx="463781" cy="553998"/>
               </a:xfrm>
               <a:prstGeom prst="rect">
@@ -16821,7 +16864,7 @@
         </p:nvSpPr>
         <p:spPr>
           <a:xfrm>
-            <a:off x="2597959" y="4286412"/>
+            <a:off x="5130143" y="4302469"/>
             <a:ext cx="1386277" cy="369332"/>
           </a:xfrm>
           <a:prstGeom prst="rect">
@@ -16856,7 +16899,7 @@
         </p:nvSpPr>
         <p:spPr>
           <a:xfrm>
-            <a:off x="6603569" y="4299012"/>
+            <a:off x="922614" y="4315069"/>
             <a:ext cx="1162498" cy="369332"/>
           </a:xfrm>
           <a:prstGeom prst="rect">
@@ -16891,7 +16934,7 @@
         </p:nvCxnSpPr>
         <p:spPr>
           <a:xfrm flipV="1">
-            <a:off x="1142454" y="2074128"/>
+            <a:off x="3674638" y="2090185"/>
             <a:ext cx="0" cy="1905000"/>
           </a:xfrm>
           <a:prstGeom prst="straightConnector1">
@@ -16933,7 +16976,7 @@
         </p:nvCxnSpPr>
         <p:spPr>
           <a:xfrm flipV="1">
-            <a:off x="1214453" y="4033543"/>
+            <a:off x="3746637" y="4049600"/>
             <a:ext cx="2304158" cy="8400"/>
           </a:xfrm>
           <a:prstGeom prst="straightConnector1">
@@ -16975,7 +17018,7 @@
             </p:nvSpPr>
             <p:spPr>
               <a:xfrm>
-                <a:off x="3191360" y="3433530"/>
+                <a:off x="5723544" y="3449587"/>
                 <a:ext cx="575799" cy="553998"/>
               </a:xfrm>
               <a:prstGeom prst="rect">
@@ -16989,6 +17032,7 @@
               </a:bodyPr>
               <a:lstStyle/>
               <a:p>
+                <a:pPr/>
                 <a14:m>
                   <m:oMathPara xmlns:m="http://schemas.openxmlformats.org/officeDocument/2006/math">
                     <m:oMathParaPr>
@@ -17032,7 +17076,7 @@
             </p:nvSpPr>
             <p:spPr>
               <a:xfrm>
-                <a:off x="3191360" y="3433530"/>
+                <a:off x="5723544" y="3449587"/>
                 <a:ext cx="575799" cy="553998"/>
               </a:xfrm>
               <a:prstGeom prst="rect">
@@ -17076,7 +17120,7 @@
             </p:nvSpPr>
             <p:spPr>
               <a:xfrm>
-                <a:off x="726371" y="1715944"/>
+                <a:off x="3258555" y="1732001"/>
                 <a:ext cx="585417" cy="553998"/>
               </a:xfrm>
               <a:prstGeom prst="rect">
@@ -17090,6 +17134,7 @@
               </a:bodyPr>
               <a:lstStyle/>
               <a:p>
+                <a:pPr/>
                 <a14:m>
                   <m:oMathPara xmlns:m="http://schemas.openxmlformats.org/officeDocument/2006/math">
                     <m:oMathParaPr>
@@ -17133,7 +17178,7 @@
             </p:nvSpPr>
             <p:spPr>
               <a:xfrm>
-                <a:off x="726371" y="1715944"/>
+                <a:off x="3258555" y="1732001"/>
                 <a:ext cx="585417" cy="553998"/>
               </a:xfrm>
               <a:prstGeom prst="rect">
@@ -17142,7 +17187,7 @@
               <a:blipFill>
                 <a:blip r:embed="rId7"/>
                 <a:stretch>
-                  <a:fillRect l="-8511" r="-8511" b="-20000"/>
+                  <a:fillRect l="-8511" r="-8511" b="-20455"/>
                 </a:stretch>
               </a:blipFill>
             </p:spPr>
@@ -17176,8 +17221,8 @@
           <p:nvPr/>
         </p:nvCxnSpPr>
         <p:spPr>
-          <a:xfrm flipH="1">
-            <a:off x="6208221" y="4041942"/>
+          <a:xfrm>
+            <a:off x="1674396" y="4048922"/>
             <a:ext cx="1084522" cy="0"/>
           </a:xfrm>
           <a:prstGeom prst="straightConnector1">
@@ -17219,7 +17264,7 @@
             </p:nvSpPr>
             <p:spPr>
               <a:xfrm>
-                <a:off x="6117758" y="3495126"/>
+                <a:off x="2175585" y="3550581"/>
                 <a:ext cx="473399" cy="553998"/>
               </a:xfrm>
               <a:prstGeom prst="rect">
@@ -17268,7 +17313,7 @@
             </p:nvSpPr>
             <p:spPr>
               <a:xfrm>
-                <a:off x="6117758" y="3495126"/>
+                <a:off x="2175585" y="3550581"/>
                 <a:ext cx="473399" cy="553998"/>
               </a:xfrm>
               <a:prstGeom prst="rect">
@@ -17277,7 +17322,7 @@
               <a:blipFill>
                 <a:blip r:embed="rId8"/>
                 <a:stretch>
-                  <a:fillRect t="-13636" r="-28947" b="-34091"/>
+                  <a:fillRect t="-11111" r="-28947" b="-31111"/>
                 </a:stretch>
               </a:blipFill>
             </p:spPr>
@@ -17312,7 +17357,7 @@
         </p:nvSpPr>
         <p:spPr>
           <a:xfrm>
-            <a:off x="7220742" y="3961543"/>
+            <a:off x="1539787" y="3977600"/>
             <a:ext cx="144000" cy="144000"/>
           </a:xfrm>
           <a:prstGeom prst="ellipse">
@@ -17360,7 +17405,7 @@
         </p:nvSpPr>
         <p:spPr>
           <a:xfrm>
-            <a:off x="1078834" y="3955583"/>
+            <a:off x="3611018" y="3971640"/>
             <a:ext cx="144000" cy="144000"/>
           </a:xfrm>
           <a:prstGeom prst="ellipse">
@@ -17406,7 +17451,7 @@
         </p:nvSpPr>
         <p:spPr>
           <a:xfrm>
-            <a:off x="665501" y="3772125"/>
+            <a:off x="3197685" y="3788182"/>
             <a:ext cx="407484" cy="553998"/>
           </a:xfrm>
           <a:prstGeom prst="rect">
@@ -17441,7 +17486,7 @@
         </p:nvSpPr>
         <p:spPr>
           <a:xfrm>
-            <a:off x="7393503" y="3752366"/>
+            <a:off x="1002844" y="3743587"/>
             <a:ext cx="407484" cy="553998"/>
           </a:xfrm>
           <a:prstGeom prst="rect">
@@ -17476,7 +17521,7 @@
         </p:nvSpPr>
         <p:spPr>
           <a:xfrm>
-            <a:off x="7389041" y="3101634"/>
+            <a:off x="998382" y="3092855"/>
             <a:ext cx="426720" cy="553998"/>
           </a:xfrm>
           <a:prstGeom prst="rect">
@@ -26417,6 +26462,21 @@
 </file>
 
 <file path=customXml/item1.xml><?xml version="1.0" encoding="utf-8"?>
+<?mso-contentType ?>
+<FormTemplates xmlns="http://schemas.microsoft.com/sharepoint/v3/contenttype/forms">
+  <Display>DocumentLibraryForm</Display>
+  <Edit>DocumentLibraryForm</Edit>
+  <New>DocumentLibraryForm</New>
+</FormTemplates>
+</file>
+
+<file path=customXml/item2.xml><?xml version="1.0" encoding="utf-8"?>
+<p:properties xmlns:p="http://schemas.microsoft.com/office/2006/metadata/properties" xmlns:xsi="http://www.w3.org/2001/XMLSchema-instance" xmlns:pc="http://schemas.microsoft.com/office/infopath/2007/PartnerControls">
+  <documentManagement/>
+</p:properties>
+</file>
+
+<file path=customXml/item3.xml><?xml version="1.0" encoding="utf-8"?>
 <ct:contentTypeSchema xmlns:ct="http://schemas.microsoft.com/office/2006/metadata/contentType" xmlns:ma="http://schemas.microsoft.com/office/2006/metadata/properties/metaAttributes" ct:_="" ma:_="" ma:contentTypeName="Document" ma:contentTypeID="0x010100A06DF21F5BB2734A800ED30F3F452129" ma:contentTypeVersion="12" ma:contentTypeDescription="Create a new document." ma:contentTypeScope="" ma:versionID="544d96a5fbac5de9d5d902b535c73fb2">
   <xsd:schema xmlns:xsd="http://www.w3.org/2001/XMLSchema" xmlns:xs="http://www.w3.org/2001/XMLSchema" xmlns:p="http://schemas.microsoft.com/office/2006/metadata/properties" xmlns:ns3="90d05cb5-950f-4f68-bc2c-e17794455b92" xmlns:ns4="b4eab9fa-dbb0-4082-8491-8bd54207a265" targetNamespace="http://schemas.microsoft.com/office/2006/metadata/properties" ma:root="true" ma:fieldsID="7a710efc71c2169bf9c05e5a40dddf12" ns3:_="" ns4:_="">
     <xsd:import namespace="90d05cb5-950f-4f68-bc2c-e17794455b92"/>
@@ -26633,22 +26693,24 @@
 </ct:contentTypeSchema>
 </file>
 
-<file path=customXml/item2.xml><?xml version="1.0" encoding="utf-8"?>
-<p:properties xmlns:p="http://schemas.microsoft.com/office/2006/metadata/properties" xmlns:xsi="http://www.w3.org/2001/XMLSchema-instance" xmlns:pc="http://schemas.microsoft.com/office/infopath/2007/PartnerControls">
-  <documentManagement/>
-</p:properties>
+<file path=customXml/itemProps1.xml><?xml version="1.0" encoding="utf-8"?>
+<ds:datastoreItem xmlns:ds="http://schemas.openxmlformats.org/officeDocument/2006/customXml" ds:itemID="{F5CF5F32-56DC-4068-8B04-457CF34A96F3}">
+  <ds:schemaRefs>
+    <ds:schemaRef ds:uri="http://schemas.microsoft.com/sharepoint/v3/contenttype/forms"/>
+  </ds:schemaRefs>
+</ds:datastoreItem>
 </file>
 
-<file path=customXml/item3.xml><?xml version="1.0" encoding="utf-8"?>
-<?mso-contentType ?>
-<FormTemplates xmlns="http://schemas.microsoft.com/sharepoint/v3/contenttype/forms">
-  <Display>DocumentLibraryForm</Display>
-  <Edit>DocumentLibraryForm</Edit>
-  <New>DocumentLibraryForm</New>
-</FormTemplates>
+<file path=customXml/itemProps2.xml><?xml version="1.0" encoding="utf-8"?>
+<ds:datastoreItem xmlns:ds="http://schemas.openxmlformats.org/officeDocument/2006/customXml" ds:itemID="{52EB1464-66D1-425A-BBB5-7A9312BBE9C4}">
+  <ds:schemaRefs>
+    <ds:schemaRef ds:uri="http://schemas.microsoft.com/office/2006/metadata/properties"/>
+    <ds:schemaRef ds:uri="http://schemas.microsoft.com/office/infopath/2007/PartnerControls"/>
+  </ds:schemaRefs>
+</ds:datastoreItem>
 </file>
 
-<file path=customXml/itemProps1.xml><?xml version="1.0" encoding="utf-8"?>
+<file path=customXml/itemProps3.xml><?xml version="1.0" encoding="utf-8"?>
 <ds:datastoreItem xmlns:ds="http://schemas.openxmlformats.org/officeDocument/2006/customXml" ds:itemID="{A43B8A4B-79FE-4529-931C-D64224FA70E3}">
   <ds:schemaRefs>
     <ds:schemaRef ds:uri="http://schemas.microsoft.com/office/2006/metadata/contentType"/>
@@ -26665,21 +26727,4 @@
     <ds:schemaRef ds:uri="http://schemas.microsoft.com/internal/obd"/>
   </ds:schemaRefs>
 </ds:datastoreItem>
-</file>
-
-<file path=customXml/itemProps2.xml><?xml version="1.0" encoding="utf-8"?>
-<ds:datastoreItem xmlns:ds="http://schemas.openxmlformats.org/officeDocument/2006/customXml" ds:itemID="{52EB1464-66D1-425A-BBB5-7A9312BBE9C4}">
-  <ds:schemaRefs>
-    <ds:schemaRef ds:uri="http://schemas.microsoft.com/office/2006/metadata/properties"/>
-    <ds:schemaRef ds:uri="http://schemas.microsoft.com/office/infopath/2007/PartnerControls"/>
-  </ds:schemaRefs>
-</ds:datastoreItem>
-</file>
-
-<file path=customXml/itemProps3.xml><?xml version="1.0" encoding="utf-8"?>
-<ds:datastoreItem xmlns:ds="http://schemas.openxmlformats.org/officeDocument/2006/customXml" ds:itemID="{F5CF5F32-56DC-4068-8B04-457CF34A96F3}">
-  <ds:schemaRefs>
-    <ds:schemaRef ds:uri="http://schemas.microsoft.com/sharepoint/v3/contenttype/forms"/>
-  </ds:schemaRefs>
-</ds:datastoreItem>
 </file>
</xml_diff>